<commit_message>
Updated The Project Files
</commit_message>
<xml_diff>
--- a/Presentation.pptx
+++ b/Presentation.pptx
@@ -7789,7 +7789,7 @@
           <p:cNvPr id="2" name="Title 1">
             <a:extLst>
               <a:ext uri="{FF2B5EF4-FFF2-40B4-BE49-F238E27FC236}">
-                <a16:creationId xmlns:a16="http://schemas.microsoft.com/office/drawing/2014/main" xmlns="" id="{BEBB3450-1791-4CED-9F54-11766BC1BA48}"/>
+                <a16:creationId xmlns="" xmlns:a16="http://schemas.microsoft.com/office/drawing/2014/main" id="{BEBB3450-1791-4CED-9F54-11766BC1BA48}"/>
               </a:ext>
             </a:extLst>
           </p:cNvPr>
@@ -7821,7 +7821,7 @@
           <p:cNvPr id="3" name="Content Placeholder 2">
             <a:extLst>
               <a:ext uri="{FF2B5EF4-FFF2-40B4-BE49-F238E27FC236}">
-                <a16:creationId xmlns:a16="http://schemas.microsoft.com/office/drawing/2014/main" xmlns="" id="{3DB3BFF3-2CB7-474A-98D8-40943A298B7E}"/>
+                <a16:creationId xmlns="" xmlns:a16="http://schemas.microsoft.com/office/drawing/2014/main" id="{3DB3BFF3-2CB7-474A-98D8-40943A298B7E}"/>
               </a:ext>
             </a:extLst>
           </p:cNvPr>
@@ -7858,7 +7858,15 @@
             </a:r>
             <a:r>
               <a:rPr lang="en-US" sz="2000" dirty="0" smtClean="0"/>
-              <a:t>The Four Basic Arithmetic Operations (Addition, Subtraction, Multiplication &amp; Division)</a:t>
+              <a:t>The Four Basic Arithmetic Operations (Addition, Subtraction, Multiplication &amp; </a:t>
+            </a:r>
+            <a:r>
+              <a:rPr lang="en-US" sz="2000" smtClean="0"/>
+              <a:t>Division</a:t>
+            </a:r>
+            <a:r>
+              <a:rPr lang="en-US" sz="2000" smtClean="0"/>
+              <a:t>).</a:t>
             </a:r>
             <a:endParaRPr lang="en-US" sz="2000" dirty="0"/>
           </a:p>
@@ -7869,7 +7877,7 @@
           <p:cNvPr id="4" name="Title 1">
             <a:extLst>
               <a:ext uri="{FF2B5EF4-FFF2-40B4-BE49-F238E27FC236}">
-                <a16:creationId xmlns:a16="http://schemas.microsoft.com/office/drawing/2014/main" xmlns="" id="{BB5DA747-822A-4D32-85D4-AC51B65A4E66}"/>
+                <a16:creationId xmlns="" xmlns:a16="http://schemas.microsoft.com/office/drawing/2014/main" id="{BB5DA747-822A-4D32-85D4-AC51B65A4E66}"/>
               </a:ext>
             </a:extLst>
           </p:cNvPr>
@@ -8149,7 +8157,7 @@
           <p:cNvPr id="4" name="Content Placeholder 3">
             <a:extLst>
               <a:ext uri="{FF2B5EF4-FFF2-40B4-BE49-F238E27FC236}">
-                <a16:creationId xmlns:a16="http://schemas.microsoft.com/office/drawing/2014/main" xmlns="" id="{96B1279E-7733-4DAC-9972-8B7BD7FF5DA2}"/>
+                <a16:creationId xmlns="" xmlns:a16="http://schemas.microsoft.com/office/drawing/2014/main" id="{96B1279E-7733-4DAC-9972-8B7BD7FF5DA2}"/>
               </a:ext>
             </a:extLst>
           </p:cNvPr>
@@ -8188,7 +8196,6 @@
               <a:rPr lang="en-US" sz="2000" dirty="0" smtClean="0"/>
               <a:t>.</a:t>
             </a:r>
-            <a:endParaRPr lang="en-US" sz="2000" dirty="0" smtClean="0"/>
           </a:p>
           <a:p>
             <a:r>

</xml_diff>

<commit_message>
Ubdated The Presentation File
</commit_message>
<xml_diff>
--- a/Presentation.pptx
+++ b/Presentation.pptx
@@ -7789,7 +7789,7 @@
           <p:cNvPr id="2" name="Title 1">
             <a:extLst>
               <a:ext uri="{FF2B5EF4-FFF2-40B4-BE49-F238E27FC236}">
-                <a16:creationId xmlns="" xmlns:a16="http://schemas.microsoft.com/office/drawing/2014/main" id="{BEBB3450-1791-4CED-9F54-11766BC1BA48}"/>
+                <a16:creationId xmlns:a16="http://schemas.microsoft.com/office/drawing/2014/main" xmlns="" id="{BEBB3450-1791-4CED-9F54-11766BC1BA48}"/>
               </a:ext>
             </a:extLst>
           </p:cNvPr>
@@ -7821,7 +7821,7 @@
           <p:cNvPr id="3" name="Content Placeholder 2">
             <a:extLst>
               <a:ext uri="{FF2B5EF4-FFF2-40B4-BE49-F238E27FC236}">
-                <a16:creationId xmlns="" xmlns:a16="http://schemas.microsoft.com/office/drawing/2014/main" id="{3DB3BFF3-2CB7-474A-98D8-40943A298B7E}"/>
+                <a16:creationId xmlns:a16="http://schemas.microsoft.com/office/drawing/2014/main" xmlns="" id="{3DB3BFF3-2CB7-474A-98D8-40943A298B7E}"/>
               </a:ext>
             </a:extLst>
           </p:cNvPr>
@@ -7862,11 +7862,7 @@
             </a:r>
             <a:r>
               <a:rPr lang="en-US" sz="2000" smtClean="0"/>
-              <a:t>Division</a:t>
-            </a:r>
-            <a:r>
-              <a:rPr lang="en-US" sz="2000" smtClean="0"/>
-              <a:t>).</a:t>
+              <a:t>Division).</a:t>
             </a:r>
             <a:endParaRPr lang="en-US" sz="2000" dirty="0"/>
           </a:p>
@@ -7877,7 +7873,7 @@
           <p:cNvPr id="4" name="Title 1">
             <a:extLst>
               <a:ext uri="{FF2B5EF4-FFF2-40B4-BE49-F238E27FC236}">
-                <a16:creationId xmlns="" xmlns:a16="http://schemas.microsoft.com/office/drawing/2014/main" id="{BB5DA747-822A-4D32-85D4-AC51B65A4E66}"/>
+                <a16:creationId xmlns:a16="http://schemas.microsoft.com/office/drawing/2014/main" xmlns="" id="{BB5DA747-822A-4D32-85D4-AC51B65A4E66}"/>
               </a:ext>
             </a:extLst>
           </p:cNvPr>
@@ -7897,7 +7893,7 @@
         </p:spPr>
         <p:txBody>
           <a:bodyPr vert="horz" lIns="91440" tIns="45720" rIns="91440" bIns="45720" rtlCol="0" anchor="t">
-            <a:normAutofit/>
+            <a:normAutofit fontScale="92500" lnSpcReduction="20000"/>
           </a:bodyPr>
           <a:lstStyle>
             <a:lvl1pPr algn="l" defTabSz="457200" rtl="0" eaLnBrk="1" latinLnBrk="0" hangingPunct="1">
@@ -8000,7 +7996,7 @@
               <a:buChar char="•"/>
             </a:pPr>
             <a:r>
-              <a:rPr lang="en-US" sz="2200" dirty="0">
+              <a:rPr lang="en-US" sz="2200" dirty="0" smtClean="0">
                 <a:solidFill>
                   <a:schemeClr val="tx1">
                     <a:lumMod val="75000"/>
@@ -8017,7 +8013,32 @@
               <a:buChar char="•"/>
             </a:pPr>
             <a:r>
-              <a:rPr lang="en-US" sz="2200" dirty="0">
+              <a:rPr lang="en-US" sz="2200" dirty="0" smtClean="0">
+                <a:solidFill>
+                  <a:schemeClr val="tx1">
+                    <a:lumMod val="75000"/>
+                    <a:lumOff val="25000"/>
+                  </a:schemeClr>
+                </a:solidFill>
+              </a:rPr>
+              <a:t>HTML5</a:t>
+            </a:r>
+            <a:endParaRPr lang="en-US" sz="2200" dirty="0">
+              <a:solidFill>
+                <a:schemeClr val="tx1">
+                  <a:lumMod val="75000"/>
+                  <a:lumOff val="25000"/>
+                </a:schemeClr>
+              </a:solidFill>
+            </a:endParaRPr>
+          </a:p>
+          <a:p>
+            <a:pPr marL="571500" indent="-571500">
+              <a:buFont typeface="Arial" panose="020B0604020202020204" pitchFamily="34" charset="0"/>
+              <a:buChar char="•"/>
+            </a:pPr>
+            <a:r>
+              <a:rPr lang="en-US" sz="2200" dirty="0" smtClean="0">
                 <a:solidFill>
                   <a:schemeClr val="tx1">
                     <a:lumMod val="75000"/>
@@ -8027,6 +8048,31 @@
               </a:rPr>
               <a:t>CSS</a:t>
             </a:r>
+          </a:p>
+          <a:p>
+            <a:pPr marL="571500" indent="-571500">
+              <a:buFont typeface="Arial" panose="020B0604020202020204" pitchFamily="34" charset="0"/>
+              <a:buChar char="•"/>
+            </a:pPr>
+            <a:r>
+              <a:rPr lang="en-US" sz="2200" smtClean="0">
+                <a:solidFill>
+                  <a:schemeClr val="tx1">
+                    <a:lumMod val="75000"/>
+                    <a:lumOff val="25000"/>
+                  </a:schemeClr>
+                </a:solidFill>
+              </a:rPr>
+              <a:t>CSS3</a:t>
+            </a:r>
+            <a:endParaRPr lang="en-US" sz="2200" dirty="0">
+              <a:solidFill>
+                <a:schemeClr val="tx1">
+                  <a:lumMod val="75000"/>
+                  <a:lumOff val="25000"/>
+                </a:schemeClr>
+              </a:solidFill>
+            </a:endParaRPr>
           </a:p>
           <a:p>
             <a:pPr marL="571500" indent="-571500">
@@ -8157,7 +8203,7 @@
           <p:cNvPr id="4" name="Content Placeholder 3">
             <a:extLst>
               <a:ext uri="{FF2B5EF4-FFF2-40B4-BE49-F238E27FC236}">
-                <a16:creationId xmlns="" xmlns:a16="http://schemas.microsoft.com/office/drawing/2014/main" id="{96B1279E-7733-4DAC-9972-8B7BD7FF5DA2}"/>
+                <a16:creationId xmlns:a16="http://schemas.microsoft.com/office/drawing/2014/main" xmlns="" id="{96B1279E-7733-4DAC-9972-8B7BD7FF5DA2}"/>
               </a:ext>
             </a:extLst>
           </p:cNvPr>

</xml_diff>